<commit_message>
better figs and a bunch of edits to everything up to but not including results
</commit_message>
<xml_diff>
--- a/paper1/tcn.pptx
+++ b/paper1/tcn.pptx
@@ -288,7 +288,7 @@
           <a:p>
             <a:fld id="{0A76EA49-31E0-3848-9ADF-F3426262647D}" type="datetimeFigureOut">
               <a:rPr lang="en-US" smtClean="0"/>
-              <a:t>9/16/15</a:t>
+              <a:t>9/29/15</a:t>
             </a:fld>
             <a:endParaRPr lang="en-US"/>
           </a:p>
@@ -458,7 +458,7 @@
           <a:p>
             <a:fld id="{0A76EA49-31E0-3848-9ADF-F3426262647D}" type="datetimeFigureOut">
               <a:rPr lang="en-US" smtClean="0"/>
-              <a:t>9/16/15</a:t>
+              <a:t>9/29/15</a:t>
             </a:fld>
             <a:endParaRPr lang="en-US"/>
           </a:p>
@@ -638,7 +638,7 @@
           <a:p>
             <a:fld id="{0A76EA49-31E0-3848-9ADF-F3426262647D}" type="datetimeFigureOut">
               <a:rPr lang="en-US" smtClean="0"/>
-              <a:t>9/16/15</a:t>
+              <a:t>9/29/15</a:t>
             </a:fld>
             <a:endParaRPr lang="en-US"/>
           </a:p>
@@ -808,7 +808,7 @@
           <a:p>
             <a:fld id="{0A76EA49-31E0-3848-9ADF-F3426262647D}" type="datetimeFigureOut">
               <a:rPr lang="en-US" smtClean="0"/>
-              <a:t>9/16/15</a:t>
+              <a:t>9/29/15</a:t>
             </a:fld>
             <a:endParaRPr lang="en-US"/>
           </a:p>
@@ -1054,7 +1054,7 @@
           <a:p>
             <a:fld id="{0A76EA49-31E0-3848-9ADF-F3426262647D}" type="datetimeFigureOut">
               <a:rPr lang="en-US" smtClean="0"/>
-              <a:t>9/16/15</a:t>
+              <a:t>9/29/15</a:t>
             </a:fld>
             <a:endParaRPr lang="en-US"/>
           </a:p>
@@ -1342,7 +1342,7 @@
           <a:p>
             <a:fld id="{0A76EA49-31E0-3848-9ADF-F3426262647D}" type="datetimeFigureOut">
               <a:rPr lang="en-US" smtClean="0"/>
-              <a:t>9/16/15</a:t>
+              <a:t>9/29/15</a:t>
             </a:fld>
             <a:endParaRPr lang="en-US"/>
           </a:p>
@@ -1764,7 +1764,7 @@
           <a:p>
             <a:fld id="{0A76EA49-31E0-3848-9ADF-F3426262647D}" type="datetimeFigureOut">
               <a:rPr lang="en-US" smtClean="0"/>
-              <a:t>9/16/15</a:t>
+              <a:t>9/29/15</a:t>
             </a:fld>
             <a:endParaRPr lang="en-US"/>
           </a:p>
@@ -1882,7 +1882,7 @@
           <a:p>
             <a:fld id="{0A76EA49-31E0-3848-9ADF-F3426262647D}" type="datetimeFigureOut">
               <a:rPr lang="en-US" smtClean="0"/>
-              <a:t>9/16/15</a:t>
+              <a:t>9/29/15</a:t>
             </a:fld>
             <a:endParaRPr lang="en-US"/>
           </a:p>
@@ -1977,7 +1977,7 @@
           <a:p>
             <a:fld id="{0A76EA49-31E0-3848-9ADF-F3426262647D}" type="datetimeFigureOut">
               <a:rPr lang="en-US" smtClean="0"/>
-              <a:t>9/16/15</a:t>
+              <a:t>9/29/15</a:t>
             </a:fld>
             <a:endParaRPr lang="en-US"/>
           </a:p>
@@ -2254,7 +2254,7 @@
           <a:p>
             <a:fld id="{0A76EA49-31E0-3848-9ADF-F3426262647D}" type="datetimeFigureOut">
               <a:rPr lang="en-US" smtClean="0"/>
-              <a:t>9/16/15</a:t>
+              <a:t>9/29/15</a:t>
             </a:fld>
             <a:endParaRPr lang="en-US"/>
           </a:p>
@@ -2507,7 +2507,7 @@
           <a:p>
             <a:fld id="{0A76EA49-31E0-3848-9ADF-F3426262647D}" type="datetimeFigureOut">
               <a:rPr lang="en-US" smtClean="0"/>
-              <a:t>9/16/15</a:t>
+              <a:t>9/29/15</a:t>
             </a:fld>
             <a:endParaRPr lang="en-US"/>
           </a:p>
@@ -2720,7 +2720,7 @@
           <a:p>
             <a:fld id="{0A76EA49-31E0-3848-9ADF-F3426262647D}" type="datetimeFigureOut">
               <a:rPr lang="en-US" smtClean="0"/>
-              <a:t>9/16/15</a:t>
+              <a:t>9/29/15</a:t>
             </a:fld>
             <a:endParaRPr lang="en-US"/>
           </a:p>
@@ -3103,7 +3103,7 @@
         </p:nvSpPr>
         <p:spPr>
           <a:xfrm>
-            <a:off x="4033172" y="2931654"/>
+            <a:off x="2546124" y="4150854"/>
             <a:ext cx="274434" cy="261610"/>
           </a:xfrm>
           <a:prstGeom prst="rect">
@@ -3144,7 +3144,7 @@
         </p:nvSpPr>
         <p:spPr>
           <a:xfrm>
-            <a:off x="4423135" y="2922895"/>
+            <a:off x="2936087" y="4142095"/>
             <a:ext cx="269318" cy="261610"/>
           </a:xfrm>
           <a:prstGeom prst="rect">
@@ -3181,7 +3181,7 @@
         </p:nvSpPr>
         <p:spPr>
           <a:xfrm>
-            <a:off x="4245214" y="2456901"/>
+            <a:off x="2758166" y="3676101"/>
             <a:ext cx="269318" cy="261610"/>
           </a:xfrm>
           <a:prstGeom prst="rect">
@@ -3218,7 +3218,7 @@
         </p:nvSpPr>
         <p:spPr>
           <a:xfrm>
-            <a:off x="3782781" y="3121968"/>
+            <a:off x="2295733" y="4341168"/>
             <a:ext cx="248786" cy="230832"/>
           </a:xfrm>
           <a:prstGeom prst="rect">
@@ -3248,7 +3248,7 @@
         </p:nvSpPr>
         <p:spPr>
           <a:xfrm>
-            <a:off x="4692453" y="3115453"/>
+            <a:off x="3205405" y="4334653"/>
             <a:ext cx="248786" cy="230832"/>
           </a:xfrm>
           <a:prstGeom prst="rect">
@@ -3278,7 +3278,7 @@
         </p:nvSpPr>
         <p:spPr>
           <a:xfrm>
-            <a:off x="4042138" y="2542638"/>
+            <a:off x="2555090" y="3761838"/>
             <a:ext cx="243163" cy="230832"/>
           </a:xfrm>
           <a:prstGeom prst="rect">
@@ -3310,7 +3310,7 @@
         </p:nvCxnSpPr>
         <p:spPr>
           <a:xfrm flipH="1">
-            <a:off x="4170389" y="2718511"/>
+            <a:off x="2683341" y="3937711"/>
             <a:ext cx="209484" cy="213143"/>
           </a:xfrm>
           <a:prstGeom prst="line">
@@ -3342,7 +3342,7 @@
         </p:nvCxnSpPr>
         <p:spPr>
           <a:xfrm>
-            <a:off x="4379873" y="2737091"/>
+            <a:off x="2892825" y="3956291"/>
             <a:ext cx="177921" cy="185804"/>
           </a:xfrm>
           <a:prstGeom prst="line">

</xml_diff>